<commit_message>
training model and resampling function
</commit_message>
<xml_diff>
--- a/raman_week7.pptx
+++ b/raman_week7.pptx
@@ -272,7 +272,7 @@
           <a:p>
             <a:fld id="{6822D85E-D2FB-42BA-8FC7-836FE23099A3}" type="datetimeFigureOut">
               <a:rPr lang="en-CH" smtClean="0"/>
-              <a:t>24.10.2025</a:t>
+              <a:t>31.10.2025</a:t>
             </a:fld>
             <a:endParaRPr lang="en-CH"/>
           </a:p>
@@ -472,7 +472,7 @@
           <a:p>
             <a:fld id="{6822D85E-D2FB-42BA-8FC7-836FE23099A3}" type="datetimeFigureOut">
               <a:rPr lang="en-CH" smtClean="0"/>
-              <a:t>24.10.2025</a:t>
+              <a:t>31.10.2025</a:t>
             </a:fld>
             <a:endParaRPr lang="en-CH"/>
           </a:p>
@@ -682,7 +682,7 @@
           <a:p>
             <a:fld id="{6822D85E-D2FB-42BA-8FC7-836FE23099A3}" type="datetimeFigureOut">
               <a:rPr lang="en-CH" smtClean="0"/>
-              <a:t>24.10.2025</a:t>
+              <a:t>31.10.2025</a:t>
             </a:fld>
             <a:endParaRPr lang="en-CH"/>
           </a:p>
@@ -882,7 +882,7 @@
           <a:p>
             <a:fld id="{6822D85E-D2FB-42BA-8FC7-836FE23099A3}" type="datetimeFigureOut">
               <a:rPr lang="en-CH" smtClean="0"/>
-              <a:t>24.10.2025</a:t>
+              <a:t>31.10.2025</a:t>
             </a:fld>
             <a:endParaRPr lang="en-CH"/>
           </a:p>
@@ -1158,7 +1158,7 @@
           <a:p>
             <a:fld id="{6822D85E-D2FB-42BA-8FC7-836FE23099A3}" type="datetimeFigureOut">
               <a:rPr lang="en-CH" smtClean="0"/>
-              <a:t>24.10.2025</a:t>
+              <a:t>31.10.2025</a:t>
             </a:fld>
             <a:endParaRPr lang="en-CH"/>
           </a:p>
@@ -1426,7 +1426,7 @@
           <a:p>
             <a:fld id="{6822D85E-D2FB-42BA-8FC7-836FE23099A3}" type="datetimeFigureOut">
               <a:rPr lang="en-CH" smtClean="0"/>
-              <a:t>24.10.2025</a:t>
+              <a:t>31.10.2025</a:t>
             </a:fld>
             <a:endParaRPr lang="en-CH"/>
           </a:p>
@@ -1841,7 +1841,7 @@
           <a:p>
             <a:fld id="{6822D85E-D2FB-42BA-8FC7-836FE23099A3}" type="datetimeFigureOut">
               <a:rPr lang="en-CH" smtClean="0"/>
-              <a:t>24.10.2025</a:t>
+              <a:t>31.10.2025</a:t>
             </a:fld>
             <a:endParaRPr lang="en-CH"/>
           </a:p>
@@ -1983,7 +1983,7 @@
           <a:p>
             <a:fld id="{6822D85E-D2FB-42BA-8FC7-836FE23099A3}" type="datetimeFigureOut">
               <a:rPr lang="en-CH" smtClean="0"/>
-              <a:t>24.10.2025</a:t>
+              <a:t>31.10.2025</a:t>
             </a:fld>
             <a:endParaRPr lang="en-CH"/>
           </a:p>
@@ -2096,7 +2096,7 @@
           <a:p>
             <a:fld id="{6822D85E-D2FB-42BA-8FC7-836FE23099A3}" type="datetimeFigureOut">
               <a:rPr lang="en-CH" smtClean="0"/>
-              <a:t>24.10.2025</a:t>
+              <a:t>31.10.2025</a:t>
             </a:fld>
             <a:endParaRPr lang="en-CH"/>
           </a:p>
@@ -2409,7 +2409,7 @@
           <a:p>
             <a:fld id="{6822D85E-D2FB-42BA-8FC7-836FE23099A3}" type="datetimeFigureOut">
               <a:rPr lang="en-CH" smtClean="0"/>
-              <a:t>24.10.2025</a:t>
+              <a:t>31.10.2025</a:t>
             </a:fld>
             <a:endParaRPr lang="en-CH"/>
           </a:p>
@@ -2698,7 +2698,7 @@
           <a:p>
             <a:fld id="{6822D85E-D2FB-42BA-8FC7-836FE23099A3}" type="datetimeFigureOut">
               <a:rPr lang="en-CH" smtClean="0"/>
-              <a:t>24.10.2025</a:t>
+              <a:t>31.10.2025</a:t>
             </a:fld>
             <a:endParaRPr lang="en-CH"/>
           </a:p>
@@ -2941,7 +2941,7 @@
           <a:p>
             <a:fld id="{6822D85E-D2FB-42BA-8FC7-836FE23099A3}" type="datetimeFigureOut">
               <a:rPr lang="en-CH" smtClean="0"/>
-              <a:t>24.10.2025</a:t>
+              <a:t>31.10.2025</a:t>
             </a:fld>
             <a:endParaRPr lang="en-CH"/>
           </a:p>

</xml_diff>